<commit_message>
added Try/Except code block to handle 409 error caused when using the share code more than once.
</commit_message>
<xml_diff>
--- a/Rock Paper Scissors App PowerPoint.pptx
+++ b/Rock Paper Scissors App PowerPoint.pptx
@@ -7505,7 +7505,7 @@
             </a:pPr>
             <a:r>
               <a:rPr lang="en"/>
-              <a:t>E3db</a:t>
+              <a:t>e3db</a:t>
             </a:r>
             <a:endParaRPr/>
           </a:p>
@@ -8523,7 +8523,7 @@
             </a:pPr>
             <a:r>
               <a:rPr lang="en"/>
-              <a:t>Rps.py = game logic</a:t>
+              <a:t>rps.py = game logic</a:t>
             </a:r>
             <a:endParaRPr/>
           </a:p>
@@ -8885,11 +8885,11 @@
         </p:spPr>
         <p:txBody>
           <a:bodyPr anchorCtr="0" anchor="t" bIns="91425" lIns="91425" spcFirstLastPara="1" rIns="91425" wrap="square" tIns="91425">
-            <a:normAutofit fontScale="85000" lnSpcReduction="10000"/>
+            <a:normAutofit fontScale="92500" lnSpcReduction="20000"/>
           </a:bodyPr>
           <a:lstStyle/>
           <a:p>
-            <a:pPr indent="-325755" lvl="0" marL="457200" rtl="0" algn="l">
+            <a:pPr indent="-334327" lvl="0" marL="457200" rtl="0" algn="l">
               <a:spcBef>
                 <a:spcPts val="0"/>
               </a:spcBef>
@@ -8901,12 +8901,12 @@
             </a:pPr>
             <a:r>
               <a:rPr lang="en"/>
-              <a:t>Make sure to delete previous app data in the client records before running the scripts again.</a:t>
-            </a:r>
-            <a:endParaRPr/>
-          </a:p>
-          <a:p>
-            <a:pPr indent="-325755" lvl="0" marL="457200" rtl="0" algn="l">
+              <a:t>The data needs to be shared only once from client to third-party client. Once the data is shared, it is recorded on the server and stays until access is revoked by the client that shared it. It is for this reason that a Try/Except code block is used in the code. Without it, if the share code is used again it creates a 409 duplicate error and prevents the code from continuing.</a:t>
+            </a:r>
+            <a:endParaRPr/>
+          </a:p>
+          <a:p>
+            <a:pPr indent="-334327" lvl="0" marL="457200" rtl="0" algn="l">
               <a:spcBef>
                 <a:spcPts val="0"/>
               </a:spcBef>
@@ -8918,12 +8918,12 @@
             </a:pPr>
             <a:r>
               <a:rPr lang="en"/>
-              <a:t>The scripts must be run in a specific order. If this is not done there will be failures and duplicated data in the client record list that will prevent the app from continuing to work unless the duplicates are deleted:</a:t>
-            </a:r>
-            <a:endParaRPr/>
-          </a:p>
-          <a:p>
-            <a:pPr indent="-304165" lvl="1" marL="914400" rtl="0" algn="l">
+              <a:t>The scripts must be run in a specific order:</a:t>
+            </a:r>
+            <a:endParaRPr/>
+          </a:p>
+          <a:p>
+            <a:pPr indent="-310832" lvl="1" marL="914400" rtl="0" algn="l">
               <a:spcBef>
                 <a:spcPts val="0"/>
               </a:spcBef>
@@ -8940,7 +8940,7 @@
             <a:endParaRPr/>
           </a:p>
           <a:p>
-            <a:pPr indent="-304165" lvl="1" marL="914400" rtl="0" algn="l">
+            <a:pPr indent="-310832" lvl="1" marL="914400" rtl="0" algn="l">
               <a:spcBef>
                 <a:spcPts val="0"/>
               </a:spcBef>
@@ -8957,7 +8957,7 @@
             <a:endParaRPr/>
           </a:p>
           <a:p>
-            <a:pPr indent="-304165" lvl="1" marL="914400" rtl="0" algn="l">
+            <a:pPr indent="-310832" lvl="1" marL="914400" rtl="0" algn="l">
               <a:spcBef>
                 <a:spcPts val="0"/>
               </a:spcBef>
@@ -8969,12 +8969,12 @@
             </a:pPr>
             <a:r>
               <a:rPr lang="en"/>
-              <a:t>Winner.py</a:t>
-            </a:r>
-            <a:endParaRPr/>
-          </a:p>
-          <a:p>
-            <a:pPr indent="-325755" lvl="0" marL="457200" rtl="0" algn="l">
+              <a:t>winner.py</a:t>
+            </a:r>
+            <a:endParaRPr/>
+          </a:p>
+          <a:p>
+            <a:pPr indent="-334327" lvl="0" marL="457200" rtl="0" algn="l">
               <a:spcBef>
                 <a:spcPts val="0"/>
               </a:spcBef>
@@ -8999,7 +8999,7 @@
             <a:endParaRPr/>
           </a:p>
           <a:p>
-            <a:pPr indent="-325755" lvl="0" marL="457200" rtl="0" algn="l">
+            <a:pPr indent="-334327" lvl="0" marL="457200" rtl="0" algn="l">
               <a:spcBef>
                 <a:spcPts val="0"/>
               </a:spcBef>
@@ -9012,23 +9012,6 @@
             <a:r>
               <a:rPr lang="en"/>
               <a:t>It’s not the prettiest, most user friendly app in the world but it gets the job done.</a:t>
-            </a:r>
-            <a:endParaRPr/>
-          </a:p>
-          <a:p>
-            <a:pPr indent="-325755" lvl="0" marL="457200" rtl="0" algn="l">
-              <a:spcBef>
-                <a:spcPts val="0"/>
-              </a:spcBef>
-              <a:spcAft>
-                <a:spcPts val="0"/>
-              </a:spcAft>
-              <a:buSzPct val="100000"/>
-              <a:buChar char="●"/>
-            </a:pPr>
-            <a:r>
-              <a:rPr lang="en"/>
-              <a:t>I question the encryption and decryption security of the data though, because if all you need is the record_id to get it, it can be just read from the .txt files through the pickle import.</a:t>
             </a:r>
             <a:endParaRPr/>
           </a:p>
@@ -9261,7 +9244,7 @@
             </a:r>
             <a:r>
               <a:rPr lang="en"/>
-              <a:t>-party client was not necessary when you just read from the unique record_id of the record the third-party needs access to.</a:t>
+              <a:t>-party client is only needed once and if used again without being put in a Try/Except block it will cause the error.</a:t>
             </a:r>
             <a:endParaRPr/>
           </a:p>

</xml_diff>